<commit_message>
[update] change the UI of game activity
</commit_message>
<xml_diff>
--- a/Architectures.pptx
+++ b/Architectures.pptx
@@ -7,6 +7,7 @@
   <p:sldIdLst>
     <p:sldId id="257" r:id="rId2"/>
     <p:sldId id="258" r:id="rId3"/>
+    <p:sldId id="259" r:id="rId4"/>
   </p:sldIdLst>
   <p:sldSz cx="12192000" cy="6858000"/>
   <p:notesSz cx="6858000" cy="9144000"/>
@@ -105,6 +106,11 @@
       </a:defRPr>
     </a:lvl9pPr>
   </p:defaultTextStyle>
+  <p:extLst>
+    <p:ext uri="{EFAFB233-063F-42B5-8137-9DF3F51BA10A}">
+      <p15:sldGuideLst xmlns:p15="http://schemas.microsoft.com/office/powerpoint/2012/main"/>
+    </p:ext>
+  </p:extLst>
 </p:presentation>
 </file>
 
@@ -255,7 +261,7 @@
           <a:p>
             <a:fld id="{C0F4DB2A-0645-4983-BFEE-03A144AFE05A}" type="datetimeFigureOut">
               <a:rPr lang="zh-CN" altLang="en-US" smtClean="0"/>
-              <a:t>2023/7/11</a:t>
+              <a:t>2023/7/30</a:t>
             </a:fld>
             <a:endParaRPr lang="zh-CN" altLang="en-US"/>
           </a:p>
@@ -453,7 +459,7 @@
           <a:p>
             <a:fld id="{C0F4DB2A-0645-4983-BFEE-03A144AFE05A}" type="datetimeFigureOut">
               <a:rPr lang="zh-CN" altLang="en-US" smtClean="0"/>
-              <a:t>2023/7/11</a:t>
+              <a:t>2023/7/30</a:t>
             </a:fld>
             <a:endParaRPr lang="zh-CN" altLang="en-US"/>
           </a:p>
@@ -661,7 +667,7 @@
           <a:p>
             <a:fld id="{C0F4DB2A-0645-4983-BFEE-03A144AFE05A}" type="datetimeFigureOut">
               <a:rPr lang="zh-CN" altLang="en-US" smtClean="0"/>
-              <a:t>2023/7/11</a:t>
+              <a:t>2023/7/30</a:t>
             </a:fld>
             <a:endParaRPr lang="zh-CN" altLang="en-US"/>
           </a:p>
@@ -859,7 +865,7 @@
           <a:p>
             <a:fld id="{C0F4DB2A-0645-4983-BFEE-03A144AFE05A}" type="datetimeFigureOut">
               <a:rPr lang="zh-CN" altLang="en-US" smtClean="0"/>
-              <a:t>2023/7/11</a:t>
+              <a:t>2023/7/30</a:t>
             </a:fld>
             <a:endParaRPr lang="zh-CN" altLang="en-US"/>
           </a:p>
@@ -1134,7 +1140,7 @@
           <a:p>
             <a:fld id="{C0F4DB2A-0645-4983-BFEE-03A144AFE05A}" type="datetimeFigureOut">
               <a:rPr lang="zh-CN" altLang="en-US" smtClean="0"/>
-              <a:t>2023/7/11</a:t>
+              <a:t>2023/7/30</a:t>
             </a:fld>
             <a:endParaRPr lang="zh-CN" altLang="en-US"/>
           </a:p>
@@ -1399,7 +1405,7 @@
           <a:p>
             <a:fld id="{C0F4DB2A-0645-4983-BFEE-03A144AFE05A}" type="datetimeFigureOut">
               <a:rPr lang="zh-CN" altLang="en-US" smtClean="0"/>
-              <a:t>2023/7/11</a:t>
+              <a:t>2023/7/30</a:t>
             </a:fld>
             <a:endParaRPr lang="zh-CN" altLang="en-US"/>
           </a:p>
@@ -1811,7 +1817,7 @@
           <a:p>
             <a:fld id="{C0F4DB2A-0645-4983-BFEE-03A144AFE05A}" type="datetimeFigureOut">
               <a:rPr lang="zh-CN" altLang="en-US" smtClean="0"/>
-              <a:t>2023/7/11</a:t>
+              <a:t>2023/7/30</a:t>
             </a:fld>
             <a:endParaRPr lang="zh-CN" altLang="en-US"/>
           </a:p>
@@ -1952,7 +1958,7 @@
           <a:p>
             <a:fld id="{C0F4DB2A-0645-4983-BFEE-03A144AFE05A}" type="datetimeFigureOut">
               <a:rPr lang="zh-CN" altLang="en-US" smtClean="0"/>
-              <a:t>2023/7/11</a:t>
+              <a:t>2023/7/30</a:t>
             </a:fld>
             <a:endParaRPr lang="zh-CN" altLang="en-US"/>
           </a:p>
@@ -2065,7 +2071,7 @@
           <a:p>
             <a:fld id="{C0F4DB2A-0645-4983-BFEE-03A144AFE05A}" type="datetimeFigureOut">
               <a:rPr lang="zh-CN" altLang="en-US" smtClean="0"/>
-              <a:t>2023/7/11</a:t>
+              <a:t>2023/7/30</a:t>
             </a:fld>
             <a:endParaRPr lang="zh-CN" altLang="en-US"/>
           </a:p>
@@ -2376,7 +2382,7 @@
           <a:p>
             <a:fld id="{C0F4DB2A-0645-4983-BFEE-03A144AFE05A}" type="datetimeFigureOut">
               <a:rPr lang="zh-CN" altLang="en-US" smtClean="0"/>
-              <a:t>2023/7/11</a:t>
+              <a:t>2023/7/30</a:t>
             </a:fld>
             <a:endParaRPr lang="zh-CN" altLang="en-US"/>
           </a:p>
@@ -2664,7 +2670,7 @@
           <a:p>
             <a:fld id="{C0F4DB2A-0645-4983-BFEE-03A144AFE05A}" type="datetimeFigureOut">
               <a:rPr lang="zh-CN" altLang="en-US" smtClean="0"/>
-              <a:t>2023/7/11</a:t>
+              <a:t>2023/7/30</a:t>
             </a:fld>
             <a:endParaRPr lang="zh-CN" altLang="en-US"/>
           </a:p>
@@ -2905,7 +2911,7 @@
           <a:p>
             <a:fld id="{C0F4DB2A-0645-4983-BFEE-03A144AFE05A}" type="datetimeFigureOut">
               <a:rPr lang="zh-CN" altLang="en-US" smtClean="0"/>
-              <a:t>2023/7/11</a:t>
+              <a:t>2023/7/30</a:t>
             </a:fld>
             <a:endParaRPr lang="zh-CN" altLang="en-US"/>
           </a:p>
@@ -4279,6 +4285,726 @@
 </p:sld>
 </file>
 
+<file path=ppt/slides/slide3.xml><?xml version="1.0" encoding="utf-8"?>
+<p:sld xmlns:a="http://schemas.openxmlformats.org/drawingml/2006/main" xmlns:r="http://schemas.openxmlformats.org/officeDocument/2006/relationships" xmlns:p="http://schemas.openxmlformats.org/presentationml/2006/main">
+  <p:cSld>
+    <p:spTree>
+      <p:nvGrpSpPr>
+        <p:cNvPr id="1" name=""/>
+        <p:cNvGrpSpPr/>
+        <p:nvPr/>
+      </p:nvGrpSpPr>
+      <p:grpSpPr>
+        <a:xfrm>
+          <a:off x="0" y="0"/>
+          <a:ext cx="0" cy="0"/>
+          <a:chOff x="0" y="0"/>
+          <a:chExt cx="0" cy="0"/>
+        </a:xfrm>
+      </p:grpSpPr>
+      <p:pic>
+        <p:nvPicPr>
+          <p:cNvPr id="5" name="图片 4">
+            <a:extLst>
+              <a:ext uri="{FF2B5EF4-FFF2-40B4-BE49-F238E27FC236}">
+                <a16:creationId xmlns:a16="http://schemas.microsoft.com/office/drawing/2014/main" id="{07A2ADA5-727B-4DEE-9559-6FF6C290E28A}"/>
+              </a:ext>
+            </a:extLst>
+          </p:cNvPr>
+          <p:cNvPicPr>
+            <a:picLocks noChangeAspect="1"/>
+          </p:cNvPicPr>
+          <p:nvPr/>
+        </p:nvPicPr>
+        <p:blipFill>
+          <a:blip r:embed="rId2">
+            <a:extLst>
+              <a:ext uri="{28A0092B-C50C-407E-A947-70E740481C1C}">
+                <a14:useLocalDpi xmlns:a14="http://schemas.microsoft.com/office/drawing/2010/main" val="0"/>
+              </a:ext>
+            </a:extLst>
+          </a:blip>
+          <a:stretch>
+            <a:fillRect/>
+          </a:stretch>
+        </p:blipFill>
+        <p:spPr>
+          <a:xfrm>
+            <a:off x="4029740" y="2362200"/>
+            <a:ext cx="304800" cy="304800"/>
+          </a:xfrm>
+          <a:prstGeom prst="rect">
+            <a:avLst/>
+          </a:prstGeom>
+        </p:spPr>
+      </p:pic>
+      <p:pic>
+        <p:nvPicPr>
+          <p:cNvPr id="7" name="图片 6">
+            <a:extLst>
+              <a:ext uri="{FF2B5EF4-FFF2-40B4-BE49-F238E27FC236}">
+                <a16:creationId xmlns:a16="http://schemas.microsoft.com/office/drawing/2014/main" id="{994A096D-B0B2-4D5B-A582-43C636A68687}"/>
+              </a:ext>
+            </a:extLst>
+          </p:cNvPr>
+          <p:cNvPicPr>
+            <a:picLocks noChangeAspect="1"/>
+          </p:cNvPicPr>
+          <p:nvPr/>
+        </p:nvPicPr>
+        <p:blipFill>
+          <a:blip r:embed="rId3">
+            <a:extLst>
+              <a:ext uri="{28A0092B-C50C-407E-A947-70E740481C1C}">
+                <a14:useLocalDpi xmlns:a14="http://schemas.microsoft.com/office/drawing/2010/main" val="0"/>
+              </a:ext>
+            </a:extLst>
+          </a:blip>
+          <a:stretch>
+            <a:fillRect/>
+          </a:stretch>
+        </p:blipFill>
+        <p:spPr>
+          <a:xfrm>
+            <a:off x="4646190" y="2915092"/>
+            <a:ext cx="304800" cy="304800"/>
+          </a:xfrm>
+          <a:prstGeom prst="rect">
+            <a:avLst/>
+          </a:prstGeom>
+        </p:spPr>
+      </p:pic>
+      <p:pic>
+        <p:nvPicPr>
+          <p:cNvPr id="9" name="图片 8">
+            <a:extLst>
+              <a:ext uri="{FF2B5EF4-FFF2-40B4-BE49-F238E27FC236}">
+                <a16:creationId xmlns:a16="http://schemas.microsoft.com/office/drawing/2014/main" id="{0AB8DC64-CC56-4F11-AB79-9E615C65C83F}"/>
+              </a:ext>
+            </a:extLst>
+          </p:cNvPr>
+          <p:cNvPicPr>
+            <a:picLocks noChangeAspect="1"/>
+          </p:cNvPicPr>
+          <p:nvPr/>
+        </p:nvPicPr>
+        <p:blipFill>
+          <a:blip r:embed="rId4">
+            <a:extLst>
+              <a:ext uri="{28A0092B-C50C-407E-A947-70E740481C1C}">
+                <a14:useLocalDpi xmlns:a14="http://schemas.microsoft.com/office/drawing/2010/main" val="0"/>
+              </a:ext>
+            </a:extLst>
+          </a:blip>
+          <a:stretch>
+            <a:fillRect/>
+          </a:stretch>
+        </p:blipFill>
+        <p:spPr>
+          <a:xfrm>
+            <a:off x="3973034" y="4262016"/>
+            <a:ext cx="304800" cy="304800"/>
+          </a:xfrm>
+          <a:prstGeom prst="rect">
+            <a:avLst/>
+          </a:prstGeom>
+        </p:spPr>
+      </p:pic>
+      <p:pic>
+        <p:nvPicPr>
+          <p:cNvPr id="11" name="图片 10">
+            <a:extLst>
+              <a:ext uri="{FF2B5EF4-FFF2-40B4-BE49-F238E27FC236}">
+                <a16:creationId xmlns:a16="http://schemas.microsoft.com/office/drawing/2014/main" id="{0A427F63-EBA4-4B78-B331-CC2F447373B9}"/>
+              </a:ext>
+            </a:extLst>
+          </p:cNvPr>
+          <p:cNvPicPr>
+            <a:picLocks noChangeAspect="1"/>
+          </p:cNvPicPr>
+          <p:nvPr/>
+        </p:nvPicPr>
+        <p:blipFill>
+          <a:blip r:embed="rId5">
+            <a:extLst>
+              <a:ext uri="{28A0092B-C50C-407E-A947-70E740481C1C}">
+                <a14:useLocalDpi xmlns:a14="http://schemas.microsoft.com/office/drawing/2010/main" val="0"/>
+              </a:ext>
+            </a:extLst>
+          </a:blip>
+          <a:stretch>
+            <a:fillRect/>
+          </a:stretch>
+        </p:blipFill>
+        <p:spPr>
+          <a:xfrm>
+            <a:off x="4646190" y="4209628"/>
+            <a:ext cx="304800" cy="304800"/>
+          </a:xfrm>
+          <a:prstGeom prst="rect">
+            <a:avLst/>
+          </a:prstGeom>
+        </p:spPr>
+      </p:pic>
+      <p:pic>
+        <p:nvPicPr>
+          <p:cNvPr id="13" name="图片 12">
+            <a:extLst>
+              <a:ext uri="{FF2B5EF4-FFF2-40B4-BE49-F238E27FC236}">
+                <a16:creationId xmlns:a16="http://schemas.microsoft.com/office/drawing/2014/main" id="{8439ACDE-B8CC-4D3B-BA8F-FE80CF502D86}"/>
+              </a:ext>
+            </a:extLst>
+          </p:cNvPr>
+          <p:cNvPicPr>
+            <a:picLocks noChangeAspect="1"/>
+          </p:cNvPicPr>
+          <p:nvPr/>
+        </p:nvPicPr>
+        <p:blipFill>
+          <a:blip r:embed="rId6">
+            <a:extLst>
+              <a:ext uri="{28A0092B-C50C-407E-A947-70E740481C1C}">
+                <a14:useLocalDpi xmlns:a14="http://schemas.microsoft.com/office/drawing/2010/main" val="0"/>
+              </a:ext>
+            </a:extLst>
+          </a:blip>
+          <a:stretch>
+            <a:fillRect/>
+          </a:stretch>
+        </p:blipFill>
+        <p:spPr>
+          <a:xfrm>
+            <a:off x="3973034" y="3622978"/>
+            <a:ext cx="304800" cy="304800"/>
+          </a:xfrm>
+          <a:prstGeom prst="rect">
+            <a:avLst/>
+          </a:prstGeom>
+        </p:spPr>
+      </p:pic>
+      <p:sp>
+        <p:nvSpPr>
+          <p:cNvPr id="15" name="矩形 14">
+            <a:extLst>
+              <a:ext uri="{FF2B5EF4-FFF2-40B4-BE49-F238E27FC236}">
+                <a16:creationId xmlns:a16="http://schemas.microsoft.com/office/drawing/2014/main" id="{2E4B1A31-CA30-4864-A3EC-0E4DC9FE3599}"/>
+              </a:ext>
+            </a:extLst>
+          </p:cNvPr>
+          <p:cNvSpPr/>
+          <p:nvPr/>
+        </p:nvSpPr>
+        <p:spPr>
+          <a:xfrm>
+            <a:off x="4238630" y="2758327"/>
+            <a:ext cx="466794" cy="707886"/>
+          </a:xfrm>
+          <a:prstGeom prst="rect">
+            <a:avLst/>
+          </a:prstGeom>
+          <a:noFill/>
+        </p:spPr>
+        <p:txBody>
+          <a:bodyPr wrap="none" lIns="91440" tIns="45720" rIns="91440" bIns="45720">
+            <a:spAutoFit/>
+            <a:scene3d>
+              <a:camera prst="orthographicFront"/>
+              <a:lightRig rig="soft" dir="t">
+                <a:rot lat="0" lon="0" rev="15600000"/>
+              </a:lightRig>
+            </a:scene3d>
+            <a:sp3d extrusionH="57150" prstMaterial="softEdge">
+              <a:bevelT w="25400" h="38100"/>
+            </a:sp3d>
+          </a:bodyPr>
+          <a:lstStyle/>
+          <a:p>
+            <a:pPr algn="ctr"/>
+            <a:r>
+              <a:rPr lang="en-US" altLang="zh-CN" sz="4000" b="1" dirty="0">
+                <a:solidFill>
+                  <a:srgbClr val="FF9900"/>
+                </a:solidFill>
+                <a:latin typeface="MV Boli" panose="02000500030200090000" pitchFamily="2" charset="0"/>
+                <a:cs typeface="MV Boli" panose="02000500030200090000" pitchFamily="2" charset="0"/>
+              </a:rPr>
+              <a:t>+</a:t>
+            </a:r>
+            <a:endParaRPr lang="zh-CN" altLang="en-US" sz="4000" b="1" dirty="0">
+              <a:solidFill>
+                <a:srgbClr val="FF9900"/>
+              </a:solidFill>
+              <a:latin typeface="MV Boli" panose="02000500030200090000" pitchFamily="2" charset="0"/>
+              <a:cs typeface="MV Boli" panose="02000500030200090000" pitchFamily="2" charset="0"/>
+            </a:endParaRPr>
+          </a:p>
+        </p:txBody>
+      </p:sp>
+      <p:sp>
+        <p:nvSpPr>
+          <p:cNvPr id="16" name="矩形 15">
+            <a:extLst>
+              <a:ext uri="{FF2B5EF4-FFF2-40B4-BE49-F238E27FC236}">
+                <a16:creationId xmlns:a16="http://schemas.microsoft.com/office/drawing/2014/main" id="{6B39C63F-B242-450E-8C77-C1CD3D5BDD4B}"/>
+              </a:ext>
+            </a:extLst>
+          </p:cNvPr>
+          <p:cNvSpPr/>
+          <p:nvPr/>
+        </p:nvSpPr>
+        <p:spPr>
+          <a:xfrm>
+            <a:off x="4997822" y="2223156"/>
+            <a:ext cx="466794" cy="707886"/>
+          </a:xfrm>
+          <a:prstGeom prst="rect">
+            <a:avLst/>
+          </a:prstGeom>
+          <a:noFill/>
+        </p:spPr>
+        <p:txBody>
+          <a:bodyPr wrap="none" lIns="91440" tIns="45720" rIns="91440" bIns="45720">
+            <a:spAutoFit/>
+            <a:scene3d>
+              <a:camera prst="orthographicFront"/>
+              <a:lightRig rig="soft" dir="t">
+                <a:rot lat="0" lon="0" rev="15600000"/>
+              </a:lightRig>
+            </a:scene3d>
+            <a:sp3d extrusionH="57150" prstMaterial="softEdge">
+              <a:bevelT w="25400" h="38100"/>
+            </a:sp3d>
+          </a:bodyPr>
+          <a:lstStyle/>
+          <a:p>
+            <a:pPr algn="ctr"/>
+            <a:r>
+              <a:rPr lang="en-US" altLang="zh-CN" sz="4000" b="1" dirty="0">
+                <a:solidFill>
+                  <a:srgbClr val="FF9900"/>
+                </a:solidFill>
+                <a:latin typeface="MV Boli" panose="02000500030200090000" pitchFamily="2" charset="0"/>
+                <a:cs typeface="MV Boli" panose="02000500030200090000" pitchFamily="2" charset="0"/>
+              </a:rPr>
+              <a:t>=</a:t>
+            </a:r>
+            <a:endParaRPr lang="zh-CN" altLang="en-US" sz="4000" b="1" dirty="0">
+              <a:solidFill>
+                <a:srgbClr val="FF9900"/>
+              </a:solidFill>
+              <a:latin typeface="MV Boli" panose="02000500030200090000" pitchFamily="2" charset="0"/>
+              <a:cs typeface="MV Boli" panose="02000500030200090000" pitchFamily="2" charset="0"/>
+            </a:endParaRPr>
+          </a:p>
+        </p:txBody>
+      </p:sp>
+      <p:pic>
+        <p:nvPicPr>
+          <p:cNvPr id="17" name="图片 16">
+            <a:extLst>
+              <a:ext uri="{FF2B5EF4-FFF2-40B4-BE49-F238E27FC236}">
+                <a16:creationId xmlns:a16="http://schemas.microsoft.com/office/drawing/2014/main" id="{52DA3B1E-752A-4A5A-8C7B-97A46920D78C}"/>
+              </a:ext>
+            </a:extLst>
+          </p:cNvPr>
+          <p:cNvPicPr>
+            <a:picLocks noChangeAspect="1"/>
+          </p:cNvPicPr>
+          <p:nvPr/>
+        </p:nvPicPr>
+        <p:blipFill>
+          <a:blip r:embed="rId7"/>
+          <a:stretch>
+            <a:fillRect/>
+          </a:stretch>
+        </p:blipFill>
+        <p:spPr>
+          <a:xfrm>
+            <a:off x="5464616" y="2915092"/>
+            <a:ext cx="485775" cy="276225"/>
+          </a:xfrm>
+          <a:prstGeom prst="rect">
+            <a:avLst/>
+          </a:prstGeom>
+        </p:spPr>
+      </p:pic>
+      <p:pic>
+        <p:nvPicPr>
+          <p:cNvPr id="18" name="图片 17">
+            <a:extLst>
+              <a:ext uri="{FF2B5EF4-FFF2-40B4-BE49-F238E27FC236}">
+                <a16:creationId xmlns:a16="http://schemas.microsoft.com/office/drawing/2014/main" id="{43BB7D98-1B4F-4C32-A786-19B916E0C6AB}"/>
+              </a:ext>
+            </a:extLst>
+          </p:cNvPr>
+          <p:cNvPicPr>
+            <a:picLocks noChangeAspect="1"/>
+          </p:cNvPicPr>
+          <p:nvPr/>
+        </p:nvPicPr>
+        <p:blipFill>
+          <a:blip r:embed="rId8"/>
+          <a:stretch>
+            <a:fillRect/>
+          </a:stretch>
+        </p:blipFill>
+        <p:spPr>
+          <a:xfrm>
+            <a:off x="5443351" y="3515599"/>
+            <a:ext cx="419100" cy="419100"/>
+          </a:xfrm>
+          <a:prstGeom prst="rect">
+            <a:avLst/>
+          </a:prstGeom>
+        </p:spPr>
+      </p:pic>
+      <p:pic>
+        <p:nvPicPr>
+          <p:cNvPr id="20" name="图片 19">
+            <a:extLst>
+              <a:ext uri="{FF2B5EF4-FFF2-40B4-BE49-F238E27FC236}">
+                <a16:creationId xmlns:a16="http://schemas.microsoft.com/office/drawing/2014/main" id="{683067B5-BAD3-4AC9-B34B-FF885C25D485}"/>
+              </a:ext>
+            </a:extLst>
+          </p:cNvPr>
+          <p:cNvPicPr>
+            <a:picLocks noChangeAspect="1"/>
+          </p:cNvPicPr>
+          <p:nvPr/>
+        </p:nvPicPr>
+        <p:blipFill>
+          <a:blip r:embed="rId9">
+            <a:extLst>
+              <a:ext uri="{28A0092B-C50C-407E-A947-70E740481C1C}">
+                <a14:useLocalDpi xmlns:a14="http://schemas.microsoft.com/office/drawing/2010/main" val="0"/>
+              </a:ext>
+            </a:extLst>
+          </a:blip>
+          <a:stretch>
+            <a:fillRect/>
+          </a:stretch>
+        </p:blipFill>
+        <p:spPr>
+          <a:xfrm>
+            <a:off x="5638779" y="2438389"/>
+            <a:ext cx="152421" cy="152421"/>
+          </a:xfrm>
+          <a:prstGeom prst="rect">
+            <a:avLst/>
+          </a:prstGeom>
+        </p:spPr>
+      </p:pic>
+      <p:pic>
+        <p:nvPicPr>
+          <p:cNvPr id="21" name="图片 20">
+            <a:extLst>
+              <a:ext uri="{FF2B5EF4-FFF2-40B4-BE49-F238E27FC236}">
+                <a16:creationId xmlns:a16="http://schemas.microsoft.com/office/drawing/2014/main" id="{413B710E-F644-42A1-B438-41237CACAF31}"/>
+              </a:ext>
+            </a:extLst>
+          </p:cNvPr>
+          <p:cNvPicPr>
+            <a:picLocks noChangeAspect="1"/>
+          </p:cNvPicPr>
+          <p:nvPr/>
+        </p:nvPicPr>
+        <p:blipFill>
+          <a:blip r:embed="rId10"/>
+          <a:stretch>
+            <a:fillRect/>
+          </a:stretch>
+        </p:blipFill>
+        <p:spPr>
+          <a:xfrm>
+            <a:off x="5471704" y="4061991"/>
+            <a:ext cx="419100" cy="504825"/>
+          </a:xfrm>
+          <a:prstGeom prst="rect">
+            <a:avLst/>
+          </a:prstGeom>
+        </p:spPr>
+      </p:pic>
+      <p:pic>
+        <p:nvPicPr>
+          <p:cNvPr id="22" name="图片 21">
+            <a:extLst>
+              <a:ext uri="{FF2B5EF4-FFF2-40B4-BE49-F238E27FC236}">
+                <a16:creationId xmlns:a16="http://schemas.microsoft.com/office/drawing/2014/main" id="{F3BD5027-1810-41D8-9B6D-E8720EDAF203}"/>
+              </a:ext>
+            </a:extLst>
+          </p:cNvPr>
+          <p:cNvPicPr>
+            <a:picLocks noChangeAspect="1"/>
+          </p:cNvPicPr>
+          <p:nvPr/>
+        </p:nvPicPr>
+        <p:blipFill>
+          <a:blip r:embed="rId2">
+            <a:extLst>
+              <a:ext uri="{28A0092B-C50C-407E-A947-70E740481C1C}">
+                <a14:useLocalDpi xmlns:a14="http://schemas.microsoft.com/office/drawing/2010/main" val="0"/>
+              </a:ext>
+            </a:extLst>
+          </a:blip>
+          <a:stretch>
+            <a:fillRect/>
+          </a:stretch>
+        </p:blipFill>
+        <p:spPr>
+          <a:xfrm>
+            <a:off x="4008475" y="2915092"/>
+            <a:ext cx="304800" cy="304800"/>
+          </a:xfrm>
+          <a:prstGeom prst="rect">
+            <a:avLst/>
+          </a:prstGeom>
+        </p:spPr>
+      </p:pic>
+      <p:sp>
+        <p:nvSpPr>
+          <p:cNvPr id="24" name="矩形 23">
+            <a:extLst>
+              <a:ext uri="{FF2B5EF4-FFF2-40B4-BE49-F238E27FC236}">
+                <a16:creationId xmlns:a16="http://schemas.microsoft.com/office/drawing/2014/main" id="{8CD264DB-90E5-450B-AF2C-A70168A67FDA}"/>
+              </a:ext>
+            </a:extLst>
+          </p:cNvPr>
+          <p:cNvSpPr/>
+          <p:nvPr/>
+        </p:nvSpPr>
+        <p:spPr>
+          <a:xfrm>
+            <a:off x="4976557" y="2792929"/>
+            <a:ext cx="466794" cy="707886"/>
+          </a:xfrm>
+          <a:prstGeom prst="rect">
+            <a:avLst/>
+          </a:prstGeom>
+          <a:noFill/>
+        </p:spPr>
+        <p:txBody>
+          <a:bodyPr wrap="none" lIns="91440" tIns="45720" rIns="91440" bIns="45720">
+            <a:spAutoFit/>
+            <a:scene3d>
+              <a:camera prst="orthographicFront"/>
+              <a:lightRig rig="soft" dir="t">
+                <a:rot lat="0" lon="0" rev="15600000"/>
+              </a:lightRig>
+            </a:scene3d>
+            <a:sp3d extrusionH="57150" prstMaterial="softEdge">
+              <a:bevelT w="25400" h="38100"/>
+            </a:sp3d>
+          </a:bodyPr>
+          <a:lstStyle/>
+          <a:p>
+            <a:pPr algn="ctr"/>
+            <a:r>
+              <a:rPr lang="en-US" altLang="zh-CN" sz="4000" b="1" dirty="0">
+                <a:solidFill>
+                  <a:srgbClr val="FF9900"/>
+                </a:solidFill>
+                <a:latin typeface="MV Boli" panose="02000500030200090000" pitchFamily="2" charset="0"/>
+                <a:cs typeface="MV Boli" panose="02000500030200090000" pitchFamily="2" charset="0"/>
+              </a:rPr>
+              <a:t>=</a:t>
+            </a:r>
+            <a:endParaRPr lang="zh-CN" altLang="en-US" sz="4000" b="1" dirty="0">
+              <a:solidFill>
+                <a:srgbClr val="FF9900"/>
+              </a:solidFill>
+              <a:latin typeface="MV Boli" panose="02000500030200090000" pitchFamily="2" charset="0"/>
+              <a:cs typeface="MV Boli" panose="02000500030200090000" pitchFamily="2" charset="0"/>
+            </a:endParaRPr>
+          </a:p>
+        </p:txBody>
+      </p:sp>
+      <p:sp>
+        <p:nvSpPr>
+          <p:cNvPr id="25" name="矩形 24">
+            <a:extLst>
+              <a:ext uri="{FF2B5EF4-FFF2-40B4-BE49-F238E27FC236}">
+                <a16:creationId xmlns:a16="http://schemas.microsoft.com/office/drawing/2014/main" id="{A64DF20D-F2E7-4C1E-92D8-42B1FF4AE571}"/>
+              </a:ext>
+            </a:extLst>
+          </p:cNvPr>
+          <p:cNvSpPr/>
+          <p:nvPr/>
+        </p:nvSpPr>
+        <p:spPr>
+          <a:xfrm>
+            <a:off x="4997822" y="3436786"/>
+            <a:ext cx="466794" cy="707886"/>
+          </a:xfrm>
+          <a:prstGeom prst="rect">
+            <a:avLst/>
+          </a:prstGeom>
+          <a:noFill/>
+        </p:spPr>
+        <p:txBody>
+          <a:bodyPr wrap="none" lIns="91440" tIns="45720" rIns="91440" bIns="45720">
+            <a:spAutoFit/>
+            <a:scene3d>
+              <a:camera prst="orthographicFront"/>
+              <a:lightRig rig="soft" dir="t">
+                <a:rot lat="0" lon="0" rev="15600000"/>
+              </a:lightRig>
+            </a:scene3d>
+            <a:sp3d extrusionH="57150" prstMaterial="softEdge">
+              <a:bevelT w="25400" h="38100"/>
+            </a:sp3d>
+          </a:bodyPr>
+          <a:lstStyle/>
+          <a:p>
+            <a:pPr algn="ctr"/>
+            <a:r>
+              <a:rPr lang="en-US" altLang="zh-CN" sz="4000" b="1" dirty="0">
+                <a:solidFill>
+                  <a:srgbClr val="FF9900"/>
+                </a:solidFill>
+                <a:latin typeface="MV Boli" panose="02000500030200090000" pitchFamily="2" charset="0"/>
+                <a:cs typeface="MV Boli" panose="02000500030200090000" pitchFamily="2" charset="0"/>
+              </a:rPr>
+              <a:t>=</a:t>
+            </a:r>
+            <a:endParaRPr lang="zh-CN" altLang="en-US" sz="4000" b="1" dirty="0">
+              <a:solidFill>
+                <a:srgbClr val="FF9900"/>
+              </a:solidFill>
+              <a:latin typeface="MV Boli" panose="02000500030200090000" pitchFamily="2" charset="0"/>
+              <a:cs typeface="MV Boli" panose="02000500030200090000" pitchFamily="2" charset="0"/>
+            </a:endParaRPr>
+          </a:p>
+        </p:txBody>
+      </p:sp>
+      <p:sp>
+        <p:nvSpPr>
+          <p:cNvPr id="27" name="矩形 26">
+            <a:extLst>
+              <a:ext uri="{FF2B5EF4-FFF2-40B4-BE49-F238E27FC236}">
+                <a16:creationId xmlns:a16="http://schemas.microsoft.com/office/drawing/2014/main" id="{421BD6AA-E1D7-47ED-9591-B2B59D7B088B}"/>
+              </a:ext>
+            </a:extLst>
+          </p:cNvPr>
+          <p:cNvSpPr/>
+          <p:nvPr/>
+        </p:nvSpPr>
+        <p:spPr>
+          <a:xfrm>
+            <a:off x="4192427" y="4105251"/>
+            <a:ext cx="466794" cy="707886"/>
+          </a:xfrm>
+          <a:prstGeom prst="rect">
+            <a:avLst/>
+          </a:prstGeom>
+          <a:noFill/>
+        </p:spPr>
+        <p:txBody>
+          <a:bodyPr wrap="none" lIns="91440" tIns="45720" rIns="91440" bIns="45720">
+            <a:spAutoFit/>
+            <a:scene3d>
+              <a:camera prst="orthographicFront"/>
+              <a:lightRig rig="soft" dir="t">
+                <a:rot lat="0" lon="0" rev="15600000"/>
+              </a:lightRig>
+            </a:scene3d>
+            <a:sp3d extrusionH="57150" prstMaterial="softEdge">
+              <a:bevelT w="25400" h="38100"/>
+            </a:sp3d>
+          </a:bodyPr>
+          <a:lstStyle/>
+          <a:p>
+            <a:pPr algn="ctr"/>
+            <a:r>
+              <a:rPr lang="en-US" altLang="zh-CN" sz="4000" b="1" dirty="0">
+                <a:solidFill>
+                  <a:srgbClr val="FF9900"/>
+                </a:solidFill>
+                <a:latin typeface="MV Boli" panose="02000500030200090000" pitchFamily="2" charset="0"/>
+                <a:cs typeface="MV Boli" panose="02000500030200090000" pitchFamily="2" charset="0"/>
+              </a:rPr>
+              <a:t>+</a:t>
+            </a:r>
+            <a:endParaRPr lang="zh-CN" altLang="en-US" sz="4000" b="1" dirty="0">
+              <a:solidFill>
+                <a:srgbClr val="FF9900"/>
+              </a:solidFill>
+              <a:latin typeface="MV Boli" panose="02000500030200090000" pitchFamily="2" charset="0"/>
+              <a:cs typeface="MV Boli" panose="02000500030200090000" pitchFamily="2" charset="0"/>
+            </a:endParaRPr>
+          </a:p>
+        </p:txBody>
+      </p:sp>
+      <p:sp>
+        <p:nvSpPr>
+          <p:cNvPr id="28" name="矩形 27">
+            <a:extLst>
+              <a:ext uri="{FF2B5EF4-FFF2-40B4-BE49-F238E27FC236}">
+                <a16:creationId xmlns:a16="http://schemas.microsoft.com/office/drawing/2014/main" id="{7F665FA6-73D5-4A5F-8E47-EC2BE7546420}"/>
+              </a:ext>
+            </a:extLst>
+          </p:cNvPr>
+          <p:cNvSpPr/>
+          <p:nvPr/>
+        </p:nvSpPr>
+        <p:spPr>
+          <a:xfrm>
+            <a:off x="4982757" y="4070588"/>
+            <a:ext cx="466794" cy="707886"/>
+          </a:xfrm>
+          <a:prstGeom prst="rect">
+            <a:avLst/>
+          </a:prstGeom>
+          <a:noFill/>
+        </p:spPr>
+        <p:txBody>
+          <a:bodyPr wrap="none" lIns="91440" tIns="45720" rIns="91440" bIns="45720">
+            <a:spAutoFit/>
+            <a:scene3d>
+              <a:camera prst="orthographicFront"/>
+              <a:lightRig rig="soft" dir="t">
+                <a:rot lat="0" lon="0" rev="15600000"/>
+              </a:lightRig>
+            </a:scene3d>
+            <a:sp3d extrusionH="57150" prstMaterial="softEdge">
+              <a:bevelT w="25400" h="38100"/>
+            </a:sp3d>
+          </a:bodyPr>
+          <a:lstStyle/>
+          <a:p>
+            <a:pPr algn="ctr"/>
+            <a:r>
+              <a:rPr lang="en-US" altLang="zh-CN" sz="4000" b="1" dirty="0">
+                <a:solidFill>
+                  <a:srgbClr val="FF9900"/>
+                </a:solidFill>
+                <a:latin typeface="MV Boli" panose="02000500030200090000" pitchFamily="2" charset="0"/>
+                <a:cs typeface="MV Boli" panose="02000500030200090000" pitchFamily="2" charset="0"/>
+              </a:rPr>
+              <a:t>=</a:t>
+            </a:r>
+            <a:endParaRPr lang="zh-CN" altLang="en-US" sz="4000" b="1" dirty="0">
+              <a:solidFill>
+                <a:srgbClr val="FF9900"/>
+              </a:solidFill>
+              <a:latin typeface="MV Boli" panose="02000500030200090000" pitchFamily="2" charset="0"/>
+              <a:cs typeface="MV Boli" panose="02000500030200090000" pitchFamily="2" charset="0"/>
+            </a:endParaRPr>
+          </a:p>
+        </p:txBody>
+      </p:sp>
+    </p:spTree>
+    <p:extLst>
+      <p:ext uri="{BB962C8B-B14F-4D97-AF65-F5344CB8AC3E}">
+        <p14:creationId xmlns:p14="http://schemas.microsoft.com/office/powerpoint/2010/main" val="2625215350"/>
+      </p:ext>
+    </p:extLst>
+  </p:cSld>
+  <p:clrMapOvr>
+    <a:masterClrMapping/>
+  </p:clrMapOvr>
+</p:sld>
+</file>
+
 <file path=ppt/theme/theme1.xml><?xml version="1.0" encoding="utf-8"?>
 <a:theme xmlns:a="http://schemas.openxmlformats.org/drawingml/2006/main" name="Office 主题​​">
   <a:themeElements>

</xml_diff>